<commit_message>
Fixed a bunch of typos in the conditional operations chapter
</commit_message>
<xml_diff>
--- a/img/05_part_data_management/06_conditional_processing/Conditional Processing.pptx
+++ b/img/05_part_data_management/06_conditional_processing/Conditional Processing.pptx
@@ -318,6 +318,11 @@
       </a:defRPr>
     </a:lvl9pPr>
   </p:defaultTextStyle>
+  <p:extLst>
+    <p:ext uri="{EFAFB233-063F-42B5-8137-9DF3F51BA10A}">
+      <p15:sldGuideLst xmlns:p15="http://schemas.microsoft.com/office/powerpoint/2012/main"/>
+    </p:ext>
+  </p:extLst>
 </p:presentation>
 </file>
 
@@ -2804,7 +2809,7 @@
           </a:ln>
           <a:extLst>
             <a:ext uri="{C572A759-6A51-4108-AA02-DFA0A04FC94B}">
-              <ma14:wrappingTextBoxFlag xmlns:ma14="http://schemas.microsoft.com/office/mac/drawingml/2011/main" xmlns:a14="http://schemas.microsoft.com/office/drawing/2010/main" xmlns:m="http://schemas.openxmlformats.org/officeDocument/2006/math" xmlns="" val="1"/>
+              <ma14:wrappingTextBoxFlag xmlns="" xmlns:m="http://schemas.openxmlformats.org/officeDocument/2006/math" xmlns:a14="http://schemas.microsoft.com/office/drawing/2010/main" xmlns:ma14="http://schemas.microsoft.com/office/mac/drawingml/2011/main" val="1"/>
             </a:ext>
           </a:extLst>
         </p:spPr>
@@ -2843,7 +2848,7 @@
           </a:ln>
           <a:extLst>
             <a:ext uri="{C572A759-6A51-4108-AA02-DFA0A04FC94B}">
-              <ma14:wrappingTextBoxFlag xmlns:ma14="http://schemas.microsoft.com/office/mac/drawingml/2011/main" xmlns:a14="http://schemas.microsoft.com/office/drawing/2010/main" xmlns:m="http://schemas.openxmlformats.org/officeDocument/2006/math" xmlns="" val="1"/>
+              <ma14:wrappingTextBoxFlag xmlns="" xmlns:m="http://schemas.openxmlformats.org/officeDocument/2006/math" xmlns:a14="http://schemas.microsoft.com/office/drawing/2010/main" xmlns:ma14="http://schemas.microsoft.com/office/mac/drawingml/2011/main" val="1"/>
             </a:ext>
           </a:extLst>
         </p:spPr>
@@ -3688,7 +3693,7 @@
           </a:ln>
           <a:extLst>
             <a:ext uri="{C572A759-6A51-4108-AA02-DFA0A04FC94B}">
-              <ma14:wrappingTextBoxFlag xmlns:ma14="http://schemas.microsoft.com/office/mac/drawingml/2011/main" xmlns:a14="http://schemas.microsoft.com/office/drawing/2010/main" xmlns:m="http://schemas.openxmlformats.org/officeDocument/2006/math" xmlns="" val="1"/>
+              <ma14:wrappingTextBoxFlag xmlns="" xmlns:m="http://schemas.openxmlformats.org/officeDocument/2006/math" xmlns:a14="http://schemas.microsoft.com/office/drawing/2010/main" xmlns:ma14="http://schemas.microsoft.com/office/mac/drawingml/2011/main" val="1"/>
             </a:ext>
           </a:extLst>
         </p:spPr>
@@ -3732,7 +3737,7 @@
           </a:ln>
           <a:extLst>
             <a:ext uri="{C572A759-6A51-4108-AA02-DFA0A04FC94B}">
-              <ma14:wrappingTextBoxFlag xmlns:ma14="http://schemas.microsoft.com/office/mac/drawingml/2011/main" xmlns:a14="http://schemas.microsoft.com/office/drawing/2010/main" xmlns:m="http://schemas.openxmlformats.org/officeDocument/2006/math" xmlns="" val="1"/>
+              <ma14:wrappingTextBoxFlag xmlns="" xmlns:m="http://schemas.openxmlformats.org/officeDocument/2006/math" xmlns:a14="http://schemas.microsoft.com/office/drawing/2010/main" xmlns:ma14="http://schemas.microsoft.com/office/mac/drawingml/2011/main" val="1"/>
             </a:ext>
           </a:extLst>
         </p:spPr>
@@ -3778,7 +3783,7 @@
           </a:ln>
           <a:extLst>
             <a:ext uri="{C572A759-6A51-4108-AA02-DFA0A04FC94B}">
-              <ma14:wrappingTextBoxFlag xmlns:ma14="http://schemas.microsoft.com/office/mac/drawingml/2011/main" xmlns:a14="http://schemas.microsoft.com/office/drawing/2010/main" xmlns:m="http://schemas.openxmlformats.org/officeDocument/2006/math" xmlns="" val="1"/>
+              <ma14:wrappingTextBoxFlag xmlns="" xmlns:m="http://schemas.openxmlformats.org/officeDocument/2006/math" xmlns:a14="http://schemas.microsoft.com/office/drawing/2010/main" xmlns:ma14="http://schemas.microsoft.com/office/mac/drawingml/2011/main" val="1"/>
             </a:ext>
           </a:extLst>
         </p:spPr>
@@ -3824,7 +3829,7 @@
           </a:ln>
           <a:extLst>
             <a:ext uri="{C572A759-6A51-4108-AA02-DFA0A04FC94B}">
-              <ma14:wrappingTextBoxFlag xmlns:ma14="http://schemas.microsoft.com/office/mac/drawingml/2011/main" xmlns:a14="http://schemas.microsoft.com/office/drawing/2010/main" xmlns:m="http://schemas.openxmlformats.org/officeDocument/2006/math" xmlns="" val="1"/>
+              <ma14:wrappingTextBoxFlag xmlns="" xmlns:m="http://schemas.openxmlformats.org/officeDocument/2006/math" xmlns:a14="http://schemas.microsoft.com/office/drawing/2010/main" xmlns:ma14="http://schemas.microsoft.com/office/mac/drawingml/2011/main" val="1"/>
             </a:ext>
           </a:extLst>
         </p:spPr>
@@ -3868,7 +3873,7 @@
           </a:ln>
           <a:extLst>
             <a:ext uri="{C572A759-6A51-4108-AA02-DFA0A04FC94B}">
-              <ma14:wrappingTextBoxFlag xmlns:ma14="http://schemas.microsoft.com/office/mac/drawingml/2011/main" xmlns:a14="http://schemas.microsoft.com/office/drawing/2010/main" xmlns:m="http://schemas.openxmlformats.org/officeDocument/2006/math" xmlns="" val="1"/>
+              <ma14:wrappingTextBoxFlag xmlns="" xmlns:m="http://schemas.openxmlformats.org/officeDocument/2006/math" xmlns:a14="http://schemas.microsoft.com/office/drawing/2010/main" xmlns:ma14="http://schemas.microsoft.com/office/mac/drawingml/2011/main" val="1"/>
             </a:ext>
           </a:extLst>
         </p:spPr>
@@ -3912,7 +3917,7 @@
           </a:ln>
           <a:extLst>
             <a:ext uri="{C572A759-6A51-4108-AA02-DFA0A04FC94B}">
-              <ma14:wrappingTextBoxFlag xmlns:ma14="http://schemas.microsoft.com/office/mac/drawingml/2011/main" xmlns:a14="http://schemas.microsoft.com/office/drawing/2010/main" xmlns:m="http://schemas.openxmlformats.org/officeDocument/2006/math" xmlns="" val="1"/>
+              <ma14:wrappingTextBoxFlag xmlns="" xmlns:m="http://schemas.openxmlformats.org/officeDocument/2006/math" xmlns:a14="http://schemas.microsoft.com/office/drawing/2010/main" xmlns:ma14="http://schemas.microsoft.com/office/mac/drawingml/2011/main" val="1"/>
             </a:ext>
           </a:extLst>
         </p:spPr>
@@ -3956,7 +3961,7 @@
           </a:ln>
           <a:extLst>
             <a:ext uri="{C572A759-6A51-4108-AA02-DFA0A04FC94B}">
-              <ma14:wrappingTextBoxFlag xmlns:ma14="http://schemas.microsoft.com/office/mac/drawingml/2011/main" xmlns:a14="http://schemas.microsoft.com/office/drawing/2010/main" xmlns:m="http://schemas.openxmlformats.org/officeDocument/2006/math" xmlns="" val="1"/>
+              <ma14:wrappingTextBoxFlag xmlns="" xmlns:m="http://schemas.openxmlformats.org/officeDocument/2006/math" xmlns:a14="http://schemas.microsoft.com/office/drawing/2010/main" xmlns:ma14="http://schemas.microsoft.com/office/mac/drawingml/2011/main" val="1"/>
             </a:ext>
           </a:extLst>
         </p:spPr>
@@ -4000,7 +4005,7 @@
           </a:ln>
           <a:extLst>
             <a:ext uri="{C572A759-6A51-4108-AA02-DFA0A04FC94B}">
-              <ma14:wrappingTextBoxFlag xmlns:ma14="http://schemas.microsoft.com/office/mac/drawingml/2011/main" xmlns:a14="http://schemas.microsoft.com/office/drawing/2010/main" xmlns:m="http://schemas.openxmlformats.org/officeDocument/2006/math" xmlns="" val="1"/>
+              <ma14:wrappingTextBoxFlag xmlns="" xmlns:m="http://schemas.openxmlformats.org/officeDocument/2006/math" xmlns:a14="http://schemas.microsoft.com/office/drawing/2010/main" xmlns:ma14="http://schemas.microsoft.com/office/mac/drawingml/2011/main" val="1"/>
             </a:ext>
           </a:extLst>
         </p:spPr>
@@ -4044,7 +4049,7 @@
           </a:ln>
           <a:extLst>
             <a:ext uri="{C572A759-6A51-4108-AA02-DFA0A04FC94B}">
-              <ma14:wrappingTextBoxFlag xmlns:ma14="http://schemas.microsoft.com/office/mac/drawingml/2011/main" xmlns:a14="http://schemas.microsoft.com/office/drawing/2010/main" xmlns:m="http://schemas.openxmlformats.org/officeDocument/2006/math" xmlns="" val="1"/>
+              <ma14:wrappingTextBoxFlag xmlns="" xmlns:m="http://schemas.openxmlformats.org/officeDocument/2006/math" xmlns:a14="http://schemas.microsoft.com/office/drawing/2010/main" xmlns:ma14="http://schemas.microsoft.com/office/mac/drawingml/2011/main" val="1"/>
             </a:ext>
           </a:extLst>
         </p:spPr>
@@ -4088,7 +4093,7 @@
           </a:ln>
           <a:extLst>
             <a:ext uri="{C572A759-6A51-4108-AA02-DFA0A04FC94B}">
-              <ma14:wrappingTextBoxFlag xmlns:ma14="http://schemas.microsoft.com/office/mac/drawingml/2011/main" xmlns:a14="http://schemas.microsoft.com/office/drawing/2010/main" xmlns:m="http://schemas.openxmlformats.org/officeDocument/2006/math" xmlns="" val="1"/>
+              <ma14:wrappingTextBoxFlag xmlns="" xmlns:m="http://schemas.openxmlformats.org/officeDocument/2006/math" xmlns:a14="http://schemas.microsoft.com/office/drawing/2010/main" xmlns:ma14="http://schemas.microsoft.com/office/mac/drawingml/2011/main" val="1"/>
             </a:ext>
           </a:extLst>
         </p:spPr>
@@ -4132,7 +4137,7 @@
           </a:ln>
           <a:extLst>
             <a:ext uri="{C572A759-6A51-4108-AA02-DFA0A04FC94B}">
-              <ma14:wrappingTextBoxFlag xmlns:ma14="http://schemas.microsoft.com/office/mac/drawingml/2011/main" xmlns:a14="http://schemas.microsoft.com/office/drawing/2010/main" xmlns:m="http://schemas.openxmlformats.org/officeDocument/2006/math" xmlns="" val="1"/>
+              <ma14:wrappingTextBoxFlag xmlns="" xmlns:m="http://schemas.openxmlformats.org/officeDocument/2006/math" xmlns:a14="http://schemas.microsoft.com/office/drawing/2010/main" xmlns:ma14="http://schemas.microsoft.com/office/mac/drawingml/2011/main" val="1"/>
             </a:ext>
           </a:extLst>
         </p:spPr>
@@ -4178,7 +4183,7 @@
           </a:ln>
           <a:extLst>
             <a:ext uri="{C572A759-6A51-4108-AA02-DFA0A04FC94B}">
-              <ma14:wrappingTextBoxFlag xmlns:ma14="http://schemas.microsoft.com/office/mac/drawingml/2011/main" xmlns:a14="http://schemas.microsoft.com/office/drawing/2010/main" xmlns:m="http://schemas.openxmlformats.org/officeDocument/2006/math" xmlns="" val="1"/>
+              <ma14:wrappingTextBoxFlag xmlns="" xmlns:m="http://schemas.openxmlformats.org/officeDocument/2006/math" xmlns:a14="http://schemas.microsoft.com/office/drawing/2010/main" xmlns:ma14="http://schemas.microsoft.com/office/mac/drawingml/2011/main" val="1"/>
             </a:ext>
           </a:extLst>
         </p:spPr>
@@ -4224,7 +4229,7 @@
           </a:ln>
           <a:extLst>
             <a:ext uri="{C572A759-6A51-4108-AA02-DFA0A04FC94B}">
-              <ma14:wrappingTextBoxFlag xmlns:ma14="http://schemas.microsoft.com/office/mac/drawingml/2011/main" xmlns:a14="http://schemas.microsoft.com/office/drawing/2010/main" xmlns:m="http://schemas.openxmlformats.org/officeDocument/2006/math" xmlns="" val="1"/>
+              <ma14:wrappingTextBoxFlag xmlns="" xmlns:m="http://schemas.openxmlformats.org/officeDocument/2006/math" xmlns:a14="http://schemas.microsoft.com/office/drawing/2010/main" xmlns:ma14="http://schemas.microsoft.com/office/mac/drawingml/2011/main" val="1"/>
             </a:ext>
           </a:extLst>
         </p:spPr>
@@ -4270,7 +4275,7 @@
           </a:ln>
           <a:extLst>
             <a:ext uri="{C572A759-6A51-4108-AA02-DFA0A04FC94B}">
-              <ma14:wrappingTextBoxFlag xmlns:ma14="http://schemas.microsoft.com/office/mac/drawingml/2011/main" xmlns:a14="http://schemas.microsoft.com/office/drawing/2010/main" xmlns:m="http://schemas.openxmlformats.org/officeDocument/2006/math" xmlns="" val="1"/>
+              <ma14:wrappingTextBoxFlag xmlns="" xmlns:m="http://schemas.openxmlformats.org/officeDocument/2006/math" xmlns:a14="http://schemas.microsoft.com/office/drawing/2010/main" xmlns:ma14="http://schemas.microsoft.com/office/mac/drawingml/2011/main" val="1"/>
             </a:ext>
           </a:extLst>
         </p:spPr>
@@ -4316,7 +4321,7 @@
           </a:ln>
           <a:extLst>
             <a:ext uri="{C572A759-6A51-4108-AA02-DFA0A04FC94B}">
-              <ma14:wrappingTextBoxFlag xmlns:ma14="http://schemas.microsoft.com/office/mac/drawingml/2011/main" xmlns:a14="http://schemas.microsoft.com/office/drawing/2010/main" xmlns:m="http://schemas.openxmlformats.org/officeDocument/2006/math" xmlns="" val="1"/>
+              <ma14:wrappingTextBoxFlag xmlns="" xmlns:m="http://schemas.openxmlformats.org/officeDocument/2006/math" xmlns:a14="http://schemas.microsoft.com/office/drawing/2010/main" xmlns:ma14="http://schemas.microsoft.com/office/mac/drawingml/2011/main" val="1"/>
             </a:ext>
           </a:extLst>
         </p:spPr>
@@ -4362,7 +4367,7 @@
           </a:ln>
           <a:extLst>
             <a:ext uri="{C572A759-6A51-4108-AA02-DFA0A04FC94B}">
-              <ma14:wrappingTextBoxFlag xmlns:ma14="http://schemas.microsoft.com/office/mac/drawingml/2011/main" xmlns:a14="http://schemas.microsoft.com/office/drawing/2010/main" xmlns:m="http://schemas.openxmlformats.org/officeDocument/2006/math" xmlns="" val="1"/>
+              <ma14:wrappingTextBoxFlag xmlns="" xmlns:m="http://schemas.openxmlformats.org/officeDocument/2006/math" xmlns:a14="http://schemas.microsoft.com/office/drawing/2010/main" xmlns:ma14="http://schemas.microsoft.com/office/mac/drawingml/2011/main" val="1"/>
             </a:ext>
           </a:extLst>
         </p:spPr>
@@ -4408,7 +4413,7 @@
           </a:ln>
           <a:extLst>
             <a:ext uri="{C572A759-6A51-4108-AA02-DFA0A04FC94B}">
-              <ma14:wrappingTextBoxFlag xmlns:ma14="http://schemas.microsoft.com/office/mac/drawingml/2011/main" xmlns:a14="http://schemas.microsoft.com/office/drawing/2010/main" xmlns:m="http://schemas.openxmlformats.org/officeDocument/2006/math" xmlns="" val="1"/>
+              <ma14:wrappingTextBoxFlag xmlns="" xmlns:m="http://schemas.openxmlformats.org/officeDocument/2006/math" xmlns:a14="http://schemas.microsoft.com/office/drawing/2010/main" xmlns:ma14="http://schemas.microsoft.com/office/mac/drawingml/2011/main" val="1"/>
             </a:ext>
           </a:extLst>
         </p:spPr>
@@ -4454,7 +4459,7 @@
           </a:ln>
           <a:extLst>
             <a:ext uri="{C572A759-6A51-4108-AA02-DFA0A04FC94B}">
-              <ma14:wrappingTextBoxFlag xmlns:ma14="http://schemas.microsoft.com/office/mac/drawingml/2011/main" xmlns:a14="http://schemas.microsoft.com/office/drawing/2010/main" xmlns:m="http://schemas.openxmlformats.org/officeDocument/2006/math" xmlns="" val="1"/>
+              <ma14:wrappingTextBoxFlag xmlns="" xmlns:m="http://schemas.openxmlformats.org/officeDocument/2006/math" xmlns:a14="http://schemas.microsoft.com/office/drawing/2010/main" xmlns:ma14="http://schemas.microsoft.com/office/mac/drawingml/2011/main" val="1"/>
             </a:ext>
           </a:extLst>
         </p:spPr>
@@ -4500,7 +4505,7 @@
           </a:ln>
           <a:extLst>
             <a:ext uri="{C572A759-6A51-4108-AA02-DFA0A04FC94B}">
-              <ma14:wrappingTextBoxFlag xmlns:ma14="http://schemas.microsoft.com/office/mac/drawingml/2011/main" xmlns:a14="http://schemas.microsoft.com/office/drawing/2010/main" xmlns:m="http://schemas.openxmlformats.org/officeDocument/2006/math" xmlns="" val="1"/>
+              <ma14:wrappingTextBoxFlag xmlns="" xmlns:m="http://schemas.openxmlformats.org/officeDocument/2006/math" xmlns:a14="http://schemas.microsoft.com/office/drawing/2010/main" xmlns:ma14="http://schemas.microsoft.com/office/mac/drawingml/2011/main" val="1"/>
             </a:ext>
           </a:extLst>
         </p:spPr>
@@ -4546,7 +4551,7 @@
           </a:ln>
           <a:extLst>
             <a:ext uri="{C572A759-6A51-4108-AA02-DFA0A04FC94B}">
-              <ma14:wrappingTextBoxFlag xmlns:ma14="http://schemas.microsoft.com/office/mac/drawingml/2011/main" xmlns:a14="http://schemas.microsoft.com/office/drawing/2010/main" xmlns:m="http://schemas.openxmlformats.org/officeDocument/2006/math" xmlns="" val="1"/>
+              <ma14:wrappingTextBoxFlag xmlns="" xmlns:m="http://schemas.openxmlformats.org/officeDocument/2006/math" xmlns:a14="http://schemas.microsoft.com/office/drawing/2010/main" xmlns:ma14="http://schemas.microsoft.com/office/mac/drawingml/2011/main" val="1"/>
             </a:ext>
           </a:extLst>
         </p:spPr>
@@ -4592,7 +4597,7 @@
           </a:ln>
           <a:extLst>
             <a:ext uri="{C572A759-6A51-4108-AA02-DFA0A04FC94B}">
-              <ma14:wrappingTextBoxFlag xmlns:ma14="http://schemas.microsoft.com/office/mac/drawingml/2011/main" xmlns:a14="http://schemas.microsoft.com/office/drawing/2010/main" xmlns:m="http://schemas.openxmlformats.org/officeDocument/2006/math" xmlns="" val="1"/>
+              <ma14:wrappingTextBoxFlag xmlns="" xmlns:m="http://schemas.openxmlformats.org/officeDocument/2006/math" xmlns:a14="http://schemas.microsoft.com/office/drawing/2010/main" xmlns:ma14="http://schemas.microsoft.com/office/mac/drawingml/2011/main" val="1"/>
             </a:ext>
           </a:extLst>
         </p:spPr>
@@ -4638,7 +4643,7 @@
           </a:ln>
           <a:extLst>
             <a:ext uri="{C572A759-6A51-4108-AA02-DFA0A04FC94B}">
-              <ma14:wrappingTextBoxFlag xmlns:ma14="http://schemas.microsoft.com/office/mac/drawingml/2011/main" xmlns:a14="http://schemas.microsoft.com/office/drawing/2010/main" xmlns:m="http://schemas.openxmlformats.org/officeDocument/2006/math" xmlns="" val="1"/>
+              <ma14:wrappingTextBoxFlag xmlns="" xmlns:m="http://schemas.openxmlformats.org/officeDocument/2006/math" xmlns:a14="http://schemas.microsoft.com/office/drawing/2010/main" xmlns:ma14="http://schemas.microsoft.com/office/mac/drawingml/2011/main" val="1"/>
             </a:ext>
           </a:extLst>
         </p:spPr>
@@ -4684,7 +4689,7 @@
           </a:ln>
           <a:extLst>
             <a:ext uri="{C572A759-6A51-4108-AA02-DFA0A04FC94B}">
-              <ma14:wrappingTextBoxFlag xmlns:ma14="http://schemas.microsoft.com/office/mac/drawingml/2011/main" xmlns:a14="http://schemas.microsoft.com/office/drawing/2010/main" xmlns:m="http://schemas.openxmlformats.org/officeDocument/2006/math" xmlns="" val="1"/>
+              <ma14:wrappingTextBoxFlag xmlns="" xmlns:m="http://schemas.openxmlformats.org/officeDocument/2006/math" xmlns:a14="http://schemas.microsoft.com/office/drawing/2010/main" xmlns:ma14="http://schemas.microsoft.com/office/mac/drawingml/2011/main" val="1"/>
             </a:ext>
           </a:extLst>
         </p:spPr>
@@ -4730,7 +4735,7 @@
           </a:ln>
           <a:extLst>
             <a:ext uri="{C572A759-6A51-4108-AA02-DFA0A04FC94B}">
-              <ma14:wrappingTextBoxFlag xmlns:ma14="http://schemas.microsoft.com/office/mac/drawingml/2011/main" xmlns:a14="http://schemas.microsoft.com/office/drawing/2010/main" xmlns:m="http://schemas.openxmlformats.org/officeDocument/2006/math" xmlns="" val="1"/>
+              <ma14:wrappingTextBoxFlag xmlns="" xmlns:m="http://schemas.openxmlformats.org/officeDocument/2006/math" xmlns:a14="http://schemas.microsoft.com/office/drawing/2010/main" xmlns:ma14="http://schemas.microsoft.com/office/mac/drawingml/2011/main" val="1"/>
             </a:ext>
           </a:extLst>
         </p:spPr>
@@ -5836,7 +5841,7 @@
           </a:ln>
           <a:extLst>
             <a:ext uri="{C572A759-6A51-4108-AA02-DFA0A04FC94B}">
-              <ma14:wrappingTextBoxFlag xmlns:ma14="http://schemas.microsoft.com/office/mac/drawingml/2011/main" xmlns:a14="http://schemas.microsoft.com/office/drawing/2010/main" xmlns:m="http://schemas.openxmlformats.org/officeDocument/2006/math" xmlns="" val="1"/>
+              <ma14:wrappingTextBoxFlag xmlns="" xmlns:m="http://schemas.openxmlformats.org/officeDocument/2006/math" xmlns:a14="http://schemas.microsoft.com/office/drawing/2010/main" xmlns:ma14="http://schemas.microsoft.com/office/mac/drawingml/2011/main" val="1"/>
             </a:ext>
           </a:extLst>
         </p:spPr>
@@ -16043,7 +16048,7 @@
         <p:dissolve/>
       </p:transition>
     </mc:Choice>
-    <mc:Fallback xmlns:a14="http://schemas.microsoft.com/office/drawing/2010/main" xmlns:m="http://schemas.openxmlformats.org/officeDocument/2006/math" xmlns="">
+    <mc:Fallback xmlns="" xmlns:m="http://schemas.openxmlformats.org/officeDocument/2006/math" xmlns:a14="http://schemas.microsoft.com/office/drawing/2010/main">
       <p:transition spd="med">
         <p:fade/>
       </p:transition>
@@ -23410,14 +23415,14 @@
           <p:nvPr>
             <p:extLst>
               <p:ext uri="{D42A27DB-BD31-4B8C-83A1-F6EECF244321}">
-                <p14:modId xmlns:p14="http://schemas.microsoft.com/office/powerpoint/2010/main" val="2119404680"/>
+                <p14:modId xmlns:p14="http://schemas.microsoft.com/office/powerpoint/2010/main" val="4070910502"/>
               </p:ext>
             </p:extLst>
           </p:nvPr>
         </p:nvGraphicFramePr>
         <p:xfrm>
           <a:off x="0" y="0"/>
-          <a:ext cx="24384000" cy="13741581"/>
+          <a:ext cx="24384000" cy="13716000"/>
         </p:xfrm>
         <a:graphic>
           <a:graphicData uri="http://schemas.openxmlformats.org/drawingml/2006/table">
@@ -23455,7 +23460,7 @@
                   </a:extLst>
                 </a:gridCol>
               </a:tblGrid>
-              <a:tr h="1281086">
+              <a:tr h="1208141">
                 <a:tc gridSpan="4">
                   <a:txBody>
                     <a:bodyPr/>
@@ -23604,7 +23609,7 @@
                   </a:ext>
                 </a:extLst>
               </a:tr>
-              <a:tr h="1281086">
+              <a:tr h="1208141">
                 <a:tc>
                   <a:txBody>
                     <a:bodyPr/>
@@ -23860,7 +23865,7 @@
                   </a:ext>
                 </a:extLst>
               </a:tr>
-              <a:tr h="3441609">
+              <a:tr h="3537665">
                 <a:tc>
                   <a:txBody>
                     <a:bodyPr/>
@@ -24121,7 +24126,7 @@
                   </a:ext>
                 </a:extLst>
               </a:tr>
-              <a:tr h="3441609">
+              <a:tr h="3537665">
                 <a:tc>
                   <a:txBody>
                     <a:bodyPr/>
@@ -24375,7 +24380,7 @@
                   </a:ext>
                 </a:extLst>
               </a:tr>
-              <a:tr h="4270609">
+              <a:tr h="4224388">
                 <a:tc>
                   <a:txBody>
                     <a:bodyPr/>

</xml_diff>

<commit_message>
First draft of introduction to repeated operations
</commit_message>
<xml_diff>
--- a/img/05_part_data_management/06_conditional_processing/Conditional Processing.pptx
+++ b/img/05_part_data_management/06_conditional_processing/Conditional Processing.pptx
@@ -2809,7 +2809,7 @@
           </a:ln>
           <a:extLst>
             <a:ext uri="{C572A759-6A51-4108-AA02-DFA0A04FC94B}">
-              <ma14:wrappingTextBoxFlag xmlns="" xmlns:m="http://schemas.openxmlformats.org/officeDocument/2006/math" xmlns:a14="http://schemas.microsoft.com/office/drawing/2010/main" xmlns:ma14="http://schemas.microsoft.com/office/mac/drawingml/2011/main" val="1"/>
+              <ma14:wrappingTextBoxFlag xmlns:ma14="http://schemas.microsoft.com/office/mac/drawingml/2011/main" xmlns:a14="http://schemas.microsoft.com/office/drawing/2010/main" xmlns:m="http://schemas.openxmlformats.org/officeDocument/2006/math" xmlns="" val="1"/>
             </a:ext>
           </a:extLst>
         </p:spPr>
@@ -2848,7 +2848,7 @@
           </a:ln>
           <a:extLst>
             <a:ext uri="{C572A759-6A51-4108-AA02-DFA0A04FC94B}">
-              <ma14:wrappingTextBoxFlag xmlns="" xmlns:m="http://schemas.openxmlformats.org/officeDocument/2006/math" xmlns:a14="http://schemas.microsoft.com/office/drawing/2010/main" xmlns:ma14="http://schemas.microsoft.com/office/mac/drawingml/2011/main" val="1"/>
+              <ma14:wrappingTextBoxFlag xmlns:ma14="http://schemas.microsoft.com/office/mac/drawingml/2011/main" xmlns:a14="http://schemas.microsoft.com/office/drawing/2010/main" xmlns:m="http://schemas.openxmlformats.org/officeDocument/2006/math" xmlns="" val="1"/>
             </a:ext>
           </a:extLst>
         </p:spPr>
@@ -3693,7 +3693,7 @@
           </a:ln>
           <a:extLst>
             <a:ext uri="{C572A759-6A51-4108-AA02-DFA0A04FC94B}">
-              <ma14:wrappingTextBoxFlag xmlns="" xmlns:m="http://schemas.openxmlformats.org/officeDocument/2006/math" xmlns:a14="http://schemas.microsoft.com/office/drawing/2010/main" xmlns:ma14="http://schemas.microsoft.com/office/mac/drawingml/2011/main" val="1"/>
+              <ma14:wrappingTextBoxFlag xmlns:ma14="http://schemas.microsoft.com/office/mac/drawingml/2011/main" xmlns:a14="http://schemas.microsoft.com/office/drawing/2010/main" xmlns:m="http://schemas.openxmlformats.org/officeDocument/2006/math" xmlns="" val="1"/>
             </a:ext>
           </a:extLst>
         </p:spPr>
@@ -3737,7 +3737,7 @@
           </a:ln>
           <a:extLst>
             <a:ext uri="{C572A759-6A51-4108-AA02-DFA0A04FC94B}">
-              <ma14:wrappingTextBoxFlag xmlns="" xmlns:m="http://schemas.openxmlformats.org/officeDocument/2006/math" xmlns:a14="http://schemas.microsoft.com/office/drawing/2010/main" xmlns:ma14="http://schemas.microsoft.com/office/mac/drawingml/2011/main" val="1"/>
+              <ma14:wrappingTextBoxFlag xmlns:ma14="http://schemas.microsoft.com/office/mac/drawingml/2011/main" xmlns:a14="http://schemas.microsoft.com/office/drawing/2010/main" xmlns:m="http://schemas.openxmlformats.org/officeDocument/2006/math" xmlns="" val="1"/>
             </a:ext>
           </a:extLst>
         </p:spPr>
@@ -3783,7 +3783,7 @@
           </a:ln>
           <a:extLst>
             <a:ext uri="{C572A759-6A51-4108-AA02-DFA0A04FC94B}">
-              <ma14:wrappingTextBoxFlag xmlns="" xmlns:m="http://schemas.openxmlformats.org/officeDocument/2006/math" xmlns:a14="http://schemas.microsoft.com/office/drawing/2010/main" xmlns:ma14="http://schemas.microsoft.com/office/mac/drawingml/2011/main" val="1"/>
+              <ma14:wrappingTextBoxFlag xmlns:ma14="http://schemas.microsoft.com/office/mac/drawingml/2011/main" xmlns:a14="http://schemas.microsoft.com/office/drawing/2010/main" xmlns:m="http://schemas.openxmlformats.org/officeDocument/2006/math" xmlns="" val="1"/>
             </a:ext>
           </a:extLst>
         </p:spPr>
@@ -3829,7 +3829,7 @@
           </a:ln>
           <a:extLst>
             <a:ext uri="{C572A759-6A51-4108-AA02-DFA0A04FC94B}">
-              <ma14:wrappingTextBoxFlag xmlns="" xmlns:m="http://schemas.openxmlformats.org/officeDocument/2006/math" xmlns:a14="http://schemas.microsoft.com/office/drawing/2010/main" xmlns:ma14="http://schemas.microsoft.com/office/mac/drawingml/2011/main" val="1"/>
+              <ma14:wrappingTextBoxFlag xmlns:ma14="http://schemas.microsoft.com/office/mac/drawingml/2011/main" xmlns:a14="http://schemas.microsoft.com/office/drawing/2010/main" xmlns:m="http://schemas.openxmlformats.org/officeDocument/2006/math" xmlns="" val="1"/>
             </a:ext>
           </a:extLst>
         </p:spPr>
@@ -3873,7 +3873,7 @@
           </a:ln>
           <a:extLst>
             <a:ext uri="{C572A759-6A51-4108-AA02-DFA0A04FC94B}">
-              <ma14:wrappingTextBoxFlag xmlns="" xmlns:m="http://schemas.openxmlformats.org/officeDocument/2006/math" xmlns:a14="http://schemas.microsoft.com/office/drawing/2010/main" xmlns:ma14="http://schemas.microsoft.com/office/mac/drawingml/2011/main" val="1"/>
+              <ma14:wrappingTextBoxFlag xmlns:ma14="http://schemas.microsoft.com/office/mac/drawingml/2011/main" xmlns:a14="http://schemas.microsoft.com/office/drawing/2010/main" xmlns:m="http://schemas.openxmlformats.org/officeDocument/2006/math" xmlns="" val="1"/>
             </a:ext>
           </a:extLst>
         </p:spPr>
@@ -3917,7 +3917,7 @@
           </a:ln>
           <a:extLst>
             <a:ext uri="{C572A759-6A51-4108-AA02-DFA0A04FC94B}">
-              <ma14:wrappingTextBoxFlag xmlns="" xmlns:m="http://schemas.openxmlformats.org/officeDocument/2006/math" xmlns:a14="http://schemas.microsoft.com/office/drawing/2010/main" xmlns:ma14="http://schemas.microsoft.com/office/mac/drawingml/2011/main" val="1"/>
+              <ma14:wrappingTextBoxFlag xmlns:ma14="http://schemas.microsoft.com/office/mac/drawingml/2011/main" xmlns:a14="http://schemas.microsoft.com/office/drawing/2010/main" xmlns:m="http://schemas.openxmlformats.org/officeDocument/2006/math" xmlns="" val="1"/>
             </a:ext>
           </a:extLst>
         </p:spPr>
@@ -3961,7 +3961,7 @@
           </a:ln>
           <a:extLst>
             <a:ext uri="{C572A759-6A51-4108-AA02-DFA0A04FC94B}">
-              <ma14:wrappingTextBoxFlag xmlns="" xmlns:m="http://schemas.openxmlformats.org/officeDocument/2006/math" xmlns:a14="http://schemas.microsoft.com/office/drawing/2010/main" xmlns:ma14="http://schemas.microsoft.com/office/mac/drawingml/2011/main" val="1"/>
+              <ma14:wrappingTextBoxFlag xmlns:ma14="http://schemas.microsoft.com/office/mac/drawingml/2011/main" xmlns:a14="http://schemas.microsoft.com/office/drawing/2010/main" xmlns:m="http://schemas.openxmlformats.org/officeDocument/2006/math" xmlns="" val="1"/>
             </a:ext>
           </a:extLst>
         </p:spPr>
@@ -4005,7 +4005,7 @@
           </a:ln>
           <a:extLst>
             <a:ext uri="{C572A759-6A51-4108-AA02-DFA0A04FC94B}">
-              <ma14:wrappingTextBoxFlag xmlns="" xmlns:m="http://schemas.openxmlformats.org/officeDocument/2006/math" xmlns:a14="http://schemas.microsoft.com/office/drawing/2010/main" xmlns:ma14="http://schemas.microsoft.com/office/mac/drawingml/2011/main" val="1"/>
+              <ma14:wrappingTextBoxFlag xmlns:ma14="http://schemas.microsoft.com/office/mac/drawingml/2011/main" xmlns:a14="http://schemas.microsoft.com/office/drawing/2010/main" xmlns:m="http://schemas.openxmlformats.org/officeDocument/2006/math" xmlns="" val="1"/>
             </a:ext>
           </a:extLst>
         </p:spPr>
@@ -4049,7 +4049,7 @@
           </a:ln>
           <a:extLst>
             <a:ext uri="{C572A759-6A51-4108-AA02-DFA0A04FC94B}">
-              <ma14:wrappingTextBoxFlag xmlns="" xmlns:m="http://schemas.openxmlformats.org/officeDocument/2006/math" xmlns:a14="http://schemas.microsoft.com/office/drawing/2010/main" xmlns:ma14="http://schemas.microsoft.com/office/mac/drawingml/2011/main" val="1"/>
+              <ma14:wrappingTextBoxFlag xmlns:ma14="http://schemas.microsoft.com/office/mac/drawingml/2011/main" xmlns:a14="http://schemas.microsoft.com/office/drawing/2010/main" xmlns:m="http://schemas.openxmlformats.org/officeDocument/2006/math" xmlns="" val="1"/>
             </a:ext>
           </a:extLst>
         </p:spPr>
@@ -4093,7 +4093,7 @@
           </a:ln>
           <a:extLst>
             <a:ext uri="{C572A759-6A51-4108-AA02-DFA0A04FC94B}">
-              <ma14:wrappingTextBoxFlag xmlns="" xmlns:m="http://schemas.openxmlformats.org/officeDocument/2006/math" xmlns:a14="http://schemas.microsoft.com/office/drawing/2010/main" xmlns:ma14="http://schemas.microsoft.com/office/mac/drawingml/2011/main" val="1"/>
+              <ma14:wrappingTextBoxFlag xmlns:ma14="http://schemas.microsoft.com/office/mac/drawingml/2011/main" xmlns:a14="http://schemas.microsoft.com/office/drawing/2010/main" xmlns:m="http://schemas.openxmlformats.org/officeDocument/2006/math" xmlns="" val="1"/>
             </a:ext>
           </a:extLst>
         </p:spPr>
@@ -4137,7 +4137,7 @@
           </a:ln>
           <a:extLst>
             <a:ext uri="{C572A759-6A51-4108-AA02-DFA0A04FC94B}">
-              <ma14:wrappingTextBoxFlag xmlns="" xmlns:m="http://schemas.openxmlformats.org/officeDocument/2006/math" xmlns:a14="http://schemas.microsoft.com/office/drawing/2010/main" xmlns:ma14="http://schemas.microsoft.com/office/mac/drawingml/2011/main" val="1"/>
+              <ma14:wrappingTextBoxFlag xmlns:ma14="http://schemas.microsoft.com/office/mac/drawingml/2011/main" xmlns:a14="http://schemas.microsoft.com/office/drawing/2010/main" xmlns:m="http://schemas.openxmlformats.org/officeDocument/2006/math" xmlns="" val="1"/>
             </a:ext>
           </a:extLst>
         </p:spPr>
@@ -4183,7 +4183,7 @@
           </a:ln>
           <a:extLst>
             <a:ext uri="{C572A759-6A51-4108-AA02-DFA0A04FC94B}">
-              <ma14:wrappingTextBoxFlag xmlns="" xmlns:m="http://schemas.openxmlformats.org/officeDocument/2006/math" xmlns:a14="http://schemas.microsoft.com/office/drawing/2010/main" xmlns:ma14="http://schemas.microsoft.com/office/mac/drawingml/2011/main" val="1"/>
+              <ma14:wrappingTextBoxFlag xmlns:ma14="http://schemas.microsoft.com/office/mac/drawingml/2011/main" xmlns:a14="http://schemas.microsoft.com/office/drawing/2010/main" xmlns:m="http://schemas.openxmlformats.org/officeDocument/2006/math" xmlns="" val="1"/>
             </a:ext>
           </a:extLst>
         </p:spPr>
@@ -4229,7 +4229,7 @@
           </a:ln>
           <a:extLst>
             <a:ext uri="{C572A759-6A51-4108-AA02-DFA0A04FC94B}">
-              <ma14:wrappingTextBoxFlag xmlns="" xmlns:m="http://schemas.openxmlformats.org/officeDocument/2006/math" xmlns:a14="http://schemas.microsoft.com/office/drawing/2010/main" xmlns:ma14="http://schemas.microsoft.com/office/mac/drawingml/2011/main" val="1"/>
+              <ma14:wrappingTextBoxFlag xmlns:ma14="http://schemas.microsoft.com/office/mac/drawingml/2011/main" xmlns:a14="http://schemas.microsoft.com/office/drawing/2010/main" xmlns:m="http://schemas.openxmlformats.org/officeDocument/2006/math" xmlns="" val="1"/>
             </a:ext>
           </a:extLst>
         </p:spPr>
@@ -4275,7 +4275,7 @@
           </a:ln>
           <a:extLst>
             <a:ext uri="{C572A759-6A51-4108-AA02-DFA0A04FC94B}">
-              <ma14:wrappingTextBoxFlag xmlns="" xmlns:m="http://schemas.openxmlformats.org/officeDocument/2006/math" xmlns:a14="http://schemas.microsoft.com/office/drawing/2010/main" xmlns:ma14="http://schemas.microsoft.com/office/mac/drawingml/2011/main" val="1"/>
+              <ma14:wrappingTextBoxFlag xmlns:ma14="http://schemas.microsoft.com/office/mac/drawingml/2011/main" xmlns:a14="http://schemas.microsoft.com/office/drawing/2010/main" xmlns:m="http://schemas.openxmlformats.org/officeDocument/2006/math" xmlns="" val="1"/>
             </a:ext>
           </a:extLst>
         </p:spPr>
@@ -4321,7 +4321,7 @@
           </a:ln>
           <a:extLst>
             <a:ext uri="{C572A759-6A51-4108-AA02-DFA0A04FC94B}">
-              <ma14:wrappingTextBoxFlag xmlns="" xmlns:m="http://schemas.openxmlformats.org/officeDocument/2006/math" xmlns:a14="http://schemas.microsoft.com/office/drawing/2010/main" xmlns:ma14="http://schemas.microsoft.com/office/mac/drawingml/2011/main" val="1"/>
+              <ma14:wrappingTextBoxFlag xmlns:ma14="http://schemas.microsoft.com/office/mac/drawingml/2011/main" xmlns:a14="http://schemas.microsoft.com/office/drawing/2010/main" xmlns:m="http://schemas.openxmlformats.org/officeDocument/2006/math" xmlns="" val="1"/>
             </a:ext>
           </a:extLst>
         </p:spPr>
@@ -4367,7 +4367,7 @@
           </a:ln>
           <a:extLst>
             <a:ext uri="{C572A759-6A51-4108-AA02-DFA0A04FC94B}">
-              <ma14:wrappingTextBoxFlag xmlns="" xmlns:m="http://schemas.openxmlformats.org/officeDocument/2006/math" xmlns:a14="http://schemas.microsoft.com/office/drawing/2010/main" xmlns:ma14="http://schemas.microsoft.com/office/mac/drawingml/2011/main" val="1"/>
+              <ma14:wrappingTextBoxFlag xmlns:ma14="http://schemas.microsoft.com/office/mac/drawingml/2011/main" xmlns:a14="http://schemas.microsoft.com/office/drawing/2010/main" xmlns:m="http://schemas.openxmlformats.org/officeDocument/2006/math" xmlns="" val="1"/>
             </a:ext>
           </a:extLst>
         </p:spPr>
@@ -4413,7 +4413,7 @@
           </a:ln>
           <a:extLst>
             <a:ext uri="{C572A759-6A51-4108-AA02-DFA0A04FC94B}">
-              <ma14:wrappingTextBoxFlag xmlns="" xmlns:m="http://schemas.openxmlformats.org/officeDocument/2006/math" xmlns:a14="http://schemas.microsoft.com/office/drawing/2010/main" xmlns:ma14="http://schemas.microsoft.com/office/mac/drawingml/2011/main" val="1"/>
+              <ma14:wrappingTextBoxFlag xmlns:ma14="http://schemas.microsoft.com/office/mac/drawingml/2011/main" xmlns:a14="http://schemas.microsoft.com/office/drawing/2010/main" xmlns:m="http://schemas.openxmlformats.org/officeDocument/2006/math" xmlns="" val="1"/>
             </a:ext>
           </a:extLst>
         </p:spPr>
@@ -4459,7 +4459,7 @@
           </a:ln>
           <a:extLst>
             <a:ext uri="{C572A759-6A51-4108-AA02-DFA0A04FC94B}">
-              <ma14:wrappingTextBoxFlag xmlns="" xmlns:m="http://schemas.openxmlformats.org/officeDocument/2006/math" xmlns:a14="http://schemas.microsoft.com/office/drawing/2010/main" xmlns:ma14="http://schemas.microsoft.com/office/mac/drawingml/2011/main" val="1"/>
+              <ma14:wrappingTextBoxFlag xmlns:ma14="http://schemas.microsoft.com/office/mac/drawingml/2011/main" xmlns:a14="http://schemas.microsoft.com/office/drawing/2010/main" xmlns:m="http://schemas.openxmlformats.org/officeDocument/2006/math" xmlns="" val="1"/>
             </a:ext>
           </a:extLst>
         </p:spPr>
@@ -4505,7 +4505,7 @@
           </a:ln>
           <a:extLst>
             <a:ext uri="{C572A759-6A51-4108-AA02-DFA0A04FC94B}">
-              <ma14:wrappingTextBoxFlag xmlns="" xmlns:m="http://schemas.openxmlformats.org/officeDocument/2006/math" xmlns:a14="http://schemas.microsoft.com/office/drawing/2010/main" xmlns:ma14="http://schemas.microsoft.com/office/mac/drawingml/2011/main" val="1"/>
+              <ma14:wrappingTextBoxFlag xmlns:ma14="http://schemas.microsoft.com/office/mac/drawingml/2011/main" xmlns:a14="http://schemas.microsoft.com/office/drawing/2010/main" xmlns:m="http://schemas.openxmlformats.org/officeDocument/2006/math" xmlns="" val="1"/>
             </a:ext>
           </a:extLst>
         </p:spPr>
@@ -4551,7 +4551,7 @@
           </a:ln>
           <a:extLst>
             <a:ext uri="{C572A759-6A51-4108-AA02-DFA0A04FC94B}">
-              <ma14:wrappingTextBoxFlag xmlns="" xmlns:m="http://schemas.openxmlformats.org/officeDocument/2006/math" xmlns:a14="http://schemas.microsoft.com/office/drawing/2010/main" xmlns:ma14="http://schemas.microsoft.com/office/mac/drawingml/2011/main" val="1"/>
+              <ma14:wrappingTextBoxFlag xmlns:ma14="http://schemas.microsoft.com/office/mac/drawingml/2011/main" xmlns:a14="http://schemas.microsoft.com/office/drawing/2010/main" xmlns:m="http://schemas.openxmlformats.org/officeDocument/2006/math" xmlns="" val="1"/>
             </a:ext>
           </a:extLst>
         </p:spPr>
@@ -4597,7 +4597,7 @@
           </a:ln>
           <a:extLst>
             <a:ext uri="{C572A759-6A51-4108-AA02-DFA0A04FC94B}">
-              <ma14:wrappingTextBoxFlag xmlns="" xmlns:m="http://schemas.openxmlformats.org/officeDocument/2006/math" xmlns:a14="http://schemas.microsoft.com/office/drawing/2010/main" xmlns:ma14="http://schemas.microsoft.com/office/mac/drawingml/2011/main" val="1"/>
+              <ma14:wrappingTextBoxFlag xmlns:ma14="http://schemas.microsoft.com/office/mac/drawingml/2011/main" xmlns:a14="http://schemas.microsoft.com/office/drawing/2010/main" xmlns:m="http://schemas.openxmlformats.org/officeDocument/2006/math" xmlns="" val="1"/>
             </a:ext>
           </a:extLst>
         </p:spPr>
@@ -4643,7 +4643,7 @@
           </a:ln>
           <a:extLst>
             <a:ext uri="{C572A759-6A51-4108-AA02-DFA0A04FC94B}">
-              <ma14:wrappingTextBoxFlag xmlns="" xmlns:m="http://schemas.openxmlformats.org/officeDocument/2006/math" xmlns:a14="http://schemas.microsoft.com/office/drawing/2010/main" xmlns:ma14="http://schemas.microsoft.com/office/mac/drawingml/2011/main" val="1"/>
+              <ma14:wrappingTextBoxFlag xmlns:ma14="http://schemas.microsoft.com/office/mac/drawingml/2011/main" xmlns:a14="http://schemas.microsoft.com/office/drawing/2010/main" xmlns:m="http://schemas.openxmlformats.org/officeDocument/2006/math" xmlns="" val="1"/>
             </a:ext>
           </a:extLst>
         </p:spPr>
@@ -4689,7 +4689,7 @@
           </a:ln>
           <a:extLst>
             <a:ext uri="{C572A759-6A51-4108-AA02-DFA0A04FC94B}">
-              <ma14:wrappingTextBoxFlag xmlns="" xmlns:m="http://schemas.openxmlformats.org/officeDocument/2006/math" xmlns:a14="http://schemas.microsoft.com/office/drawing/2010/main" xmlns:ma14="http://schemas.microsoft.com/office/mac/drawingml/2011/main" val="1"/>
+              <ma14:wrappingTextBoxFlag xmlns:ma14="http://schemas.microsoft.com/office/mac/drawingml/2011/main" xmlns:a14="http://schemas.microsoft.com/office/drawing/2010/main" xmlns:m="http://schemas.openxmlformats.org/officeDocument/2006/math" xmlns="" val="1"/>
             </a:ext>
           </a:extLst>
         </p:spPr>
@@ -4735,7 +4735,7 @@
           </a:ln>
           <a:extLst>
             <a:ext uri="{C572A759-6A51-4108-AA02-DFA0A04FC94B}">
-              <ma14:wrappingTextBoxFlag xmlns="" xmlns:m="http://schemas.openxmlformats.org/officeDocument/2006/math" xmlns:a14="http://schemas.microsoft.com/office/drawing/2010/main" xmlns:ma14="http://schemas.microsoft.com/office/mac/drawingml/2011/main" val="1"/>
+              <ma14:wrappingTextBoxFlag xmlns:ma14="http://schemas.microsoft.com/office/mac/drawingml/2011/main" xmlns:a14="http://schemas.microsoft.com/office/drawing/2010/main" xmlns:m="http://schemas.openxmlformats.org/officeDocument/2006/math" xmlns="" val="1"/>
             </a:ext>
           </a:extLst>
         </p:spPr>
@@ -5824,50 +5824,6 @@
       </p:grpSpPr>
       <p:sp>
         <p:nvSpPr>
-          <p:cNvPr id="204" name="Conditional Processing"/>
-          <p:cNvSpPr txBox="1"/>
-          <p:nvPr/>
-        </p:nvSpPr>
-        <p:spPr>
-          <a:xfrm>
-            <a:off x="8738592" y="682625"/>
-            <a:ext cx="6536867" cy="939801"/>
-          </a:xfrm>
-          <a:prstGeom prst="rect">
-            <a:avLst/>
-          </a:prstGeom>
-          <a:ln w="12700">
-            <a:miter lim="400000"/>
-          </a:ln>
-          <a:extLst>
-            <a:ext uri="{C572A759-6A51-4108-AA02-DFA0A04FC94B}">
-              <ma14:wrappingTextBoxFlag xmlns="" xmlns:m="http://schemas.openxmlformats.org/officeDocument/2006/math" xmlns:a14="http://schemas.microsoft.com/office/drawing/2010/main" xmlns:ma14="http://schemas.microsoft.com/office/mac/drawingml/2011/main" val="1"/>
-            </a:ext>
-          </a:extLst>
-        </p:spPr>
-        <p:txBody>
-          <a:bodyPr wrap="none" lIns="50800" tIns="50800" rIns="50800" bIns="50800" anchor="ctr">
-            <a:spAutoFit/>
-          </a:bodyPr>
-          <a:lstStyle>
-            <a:lvl1pPr defTabSz="546100">
-              <a:defRPr sz="5400">
-                <a:latin typeface="Gill Sans"/>
-                <a:ea typeface="Gill Sans"/>
-                <a:cs typeface="Gill Sans"/>
-                <a:sym typeface="Gill Sans"/>
-              </a:defRPr>
-            </a:lvl1pPr>
-          </a:lstStyle>
-          <a:p>
-            <a:r>
-              <a:t>Conditional Processing</a:t>
-            </a:r>
-          </a:p>
-        </p:txBody>
-      </p:sp>
-      <p:sp>
-        <p:nvSpPr>
           <p:cNvPr id="205" name="Line"/>
           <p:cNvSpPr/>
           <p:nvPr/>
@@ -5942,8 +5898,8 @@
         </p:blipFill>
         <p:spPr>
           <a:xfrm>
-            <a:off x="9741673" y="2859312"/>
-            <a:ext cx="4525984" cy="3080337"/>
+            <a:off x="8543510" y="973402"/>
+            <a:ext cx="7296981" cy="4966248"/>
           </a:xfrm>
           <a:custGeom>
             <a:avLst/>
@@ -16048,7 +16004,7 @@
         <p:dissolve/>
       </p:transition>
     </mc:Choice>
-    <mc:Fallback xmlns="" xmlns:m="http://schemas.openxmlformats.org/officeDocument/2006/math" xmlns:a14="http://schemas.microsoft.com/office/drawing/2010/main">
+    <mc:Fallback xmlns:a14="http://schemas.microsoft.com/office/drawing/2010/main" xmlns:m="http://schemas.openxmlformats.org/officeDocument/2006/math" xmlns="">
       <p:transition spd="med">
         <p:fade/>
       </p:transition>

</xml_diff>